<commit_message>
LR 1 and 2
</commit_message>
<xml_diff>
--- a/Network Engineer. Basic/Проектная работа/Presentation.pptx
+++ b/Network Engineer. Basic/Проектная работа/Presentation.pptx
@@ -12,9 +12,9 @@
     <p:sldId id="258" r:id="rId3"/>
     <p:sldId id="260" r:id="rId4"/>
     <p:sldId id="261" r:id="rId5"/>
-    <p:sldId id="274" r:id="rId6"/>
-    <p:sldId id="276" r:id="rId7"/>
-    <p:sldId id="275" r:id="rId8"/>
+    <p:sldId id="276" r:id="rId6"/>
+    <p:sldId id="275" r:id="rId7"/>
+    <p:sldId id="274" r:id="rId8"/>
     <p:sldId id="262" r:id="rId9"/>
     <p:sldId id="277" r:id="rId10"/>
     <p:sldId id="278" r:id="rId11"/>
@@ -279,9 +279,9 @@
             <p14:sldId id="258"/>
             <p14:sldId id="260"/>
             <p14:sldId id="261"/>
-            <p14:sldId id="274"/>
             <p14:sldId id="276"/>
             <p14:sldId id="275"/>
+            <p14:sldId id="274"/>
             <p14:sldId id="262"/>
             <p14:sldId id="277"/>
             <p14:sldId id="278"/>
@@ -9785,36 +9785,6 @@
       </p:sp>
       <p:pic>
         <p:nvPicPr>
-          <p:cNvPr id="5" name="Рисунок 4">
-            <a:extLst>
-              <a:ext uri="{FF2B5EF4-FFF2-40B4-BE49-F238E27FC236}">
-                <a16:creationId xmlns:a16="http://schemas.microsoft.com/office/drawing/2014/main" id="{7BDA1124-5B2B-4F0E-9A3A-E84766FDCD2B}"/>
-              </a:ext>
-            </a:extLst>
-          </p:cNvPr>
-          <p:cNvPicPr>
-            <a:picLocks noChangeAspect="1"/>
-          </p:cNvPicPr>
-          <p:nvPr/>
-        </p:nvPicPr>
-        <p:blipFill>
-          <a:blip r:embed="rId2"/>
-          <a:stretch>
-            <a:fillRect/>
-          </a:stretch>
-        </p:blipFill>
-        <p:spPr>
-          <a:xfrm>
-            <a:off x="500550" y="1300853"/>
-            <a:ext cx="2979250" cy="711643"/>
-          </a:xfrm>
-          <a:prstGeom prst="rect">
-            <a:avLst/>
-          </a:prstGeom>
-        </p:spPr>
-      </p:pic>
-      <p:pic>
-        <p:nvPicPr>
           <p:cNvPr id="7" name="Рисунок 6">
             <a:extLst>
               <a:ext uri="{FF2B5EF4-FFF2-40B4-BE49-F238E27FC236}">
@@ -9828,7 +9798,7 @@
           <p:nvPr/>
         </p:nvPicPr>
         <p:blipFill>
-          <a:blip r:embed="rId3"/>
+          <a:blip r:embed="rId2"/>
           <a:stretch>
             <a:fillRect/>
           </a:stretch>
@@ -9883,6 +9853,36 @@
           </a:p>
         </p:txBody>
       </p:sp>
+      <p:pic>
+        <p:nvPicPr>
+          <p:cNvPr id="6" name="Рисунок 5">
+            <a:extLst>
+              <a:ext uri="{FF2B5EF4-FFF2-40B4-BE49-F238E27FC236}">
+                <a16:creationId xmlns:a16="http://schemas.microsoft.com/office/drawing/2014/main" id="{326AAC9D-CD50-472D-B769-EECD5EC48F19}"/>
+              </a:ext>
+            </a:extLst>
+          </p:cNvPr>
+          <p:cNvPicPr>
+            <a:picLocks noChangeAspect="1"/>
+          </p:cNvPicPr>
+          <p:nvPr/>
+        </p:nvPicPr>
+        <p:blipFill>
+          <a:blip r:embed="rId3"/>
+          <a:stretch>
+            <a:fillRect/>
+          </a:stretch>
+        </p:blipFill>
+        <p:spPr>
+          <a:xfrm>
+            <a:off x="420929" y="1279842"/>
+            <a:ext cx="3499706" cy="932380"/>
+          </a:xfrm>
+          <a:prstGeom prst="rect">
+            <a:avLst/>
+          </a:prstGeom>
+        </p:spPr>
+      </p:pic>
     </p:spTree>
     <p:extLst>
       <p:ext uri="{BB962C8B-B14F-4D97-AF65-F5344CB8AC3E}">
@@ -10069,7 +10069,7 @@
         <p:spPr>
           <a:xfrm>
             <a:off x="500550" y="330724"/>
-            <a:ext cx="8520600" cy="600152"/>
+            <a:ext cx="8520600" cy="1095900"/>
           </a:xfrm>
         </p:spPr>
         <p:txBody>
@@ -12174,7 +12174,7 @@
           <p:nvPr>
             <p:extLst>
               <p:ext uri="{D42A27DB-BD31-4B8C-83A1-F6EECF244321}">
-                <p14:modId xmlns:p14="http://schemas.microsoft.com/office/powerpoint/2010/main" val="1244994167"/>
+                <p14:modId xmlns:p14="http://schemas.microsoft.com/office/powerpoint/2010/main" val="2457971476"/>
               </p:ext>
             </p:extLst>
           </p:nvPr>
@@ -12313,7 +12313,7 @@
                           <a:cs typeface="Roboto"/>
                           <a:sym typeface="Roboto"/>
                         </a:rPr>
-                        <a:t>PaGP</a:t>
+                        <a:t>PAgP</a:t>
                       </a:r>
                       <a:endParaRPr sz="1300" dirty="0">
                         <a:latin typeface="Roboto"/>
@@ -13492,7 +13492,7 @@
           <p:nvPr>
             <p:extLst>
               <p:ext uri="{D42A27DB-BD31-4B8C-83A1-F6EECF244321}">
-                <p14:modId xmlns:p14="http://schemas.microsoft.com/office/powerpoint/2010/main" val="1401663110"/>
+                <p14:modId xmlns:p14="http://schemas.microsoft.com/office/powerpoint/2010/main" val="2346020600"/>
               </p:ext>
             </p:extLst>
           </p:nvPr>
@@ -13797,7 +13797,7 @@
                           <a:cs typeface="Roboto"/>
                           <a:sym typeface="Roboto"/>
                         </a:rPr>
-                        <a:t>HSRP</a:t>
+                        <a:t>SSH</a:t>
                       </a:r>
                       <a:endParaRPr sz="1300" dirty="0">
                         <a:latin typeface="Roboto"/>
@@ -14126,70 +14126,6 @@
           <p:cNvPr id="2" name="Заголовок 1">
             <a:extLst>
               <a:ext uri="{FF2B5EF4-FFF2-40B4-BE49-F238E27FC236}">
-                <a16:creationId xmlns:a16="http://schemas.microsoft.com/office/drawing/2014/main" id="{62AC4228-94A0-48B7-BB14-00DCC6173E9E}"/>
-              </a:ext>
-            </a:extLst>
-          </p:cNvPr>
-          <p:cNvSpPr>
-            <a:spLocks noGrp="1"/>
-          </p:cNvSpPr>
-          <p:nvPr>
-            <p:ph type="title"/>
-          </p:nvPr>
-        </p:nvSpPr>
-        <p:spPr>
-          <a:xfrm>
-            <a:off x="500550" y="1807535"/>
-            <a:ext cx="8520600" cy="3232297"/>
-          </a:xfrm>
-        </p:spPr>
-        <p:txBody>
-          <a:bodyPr/>
-          <a:lstStyle/>
-          <a:p>
-            <a:pPr algn="ctr"/>
-            <a:r>
-              <a:rPr lang="ru-RU" sz="4000" dirty="0"/>
-              <a:t>Реализация технологий</a:t>
-            </a:r>
-          </a:p>
-        </p:txBody>
-      </p:sp>
-    </p:spTree>
-    <p:extLst>
-      <p:ext uri="{BB962C8B-B14F-4D97-AF65-F5344CB8AC3E}">
-        <p14:creationId xmlns:p14="http://schemas.microsoft.com/office/powerpoint/2010/main" val="4215395071"/>
-      </p:ext>
-    </p:extLst>
-  </p:cSld>
-  <p:clrMapOvr>
-    <a:masterClrMapping/>
-  </p:clrMapOvr>
-</p:sld>
-</file>
-
-<file path=ppt/slides/slide6.xml><?xml version="1.0" encoding="utf-8"?>
-<p:sld xmlns:a="http://schemas.openxmlformats.org/drawingml/2006/main" xmlns:r="http://schemas.openxmlformats.org/officeDocument/2006/relationships" xmlns:p="http://schemas.openxmlformats.org/presentationml/2006/main">
-  <p:cSld>
-    <p:spTree>
-      <p:nvGrpSpPr>
-        <p:cNvPr id="1" name=""/>
-        <p:cNvGrpSpPr/>
-        <p:nvPr/>
-      </p:nvGrpSpPr>
-      <p:grpSpPr>
-        <a:xfrm>
-          <a:off x="0" y="0"/>
-          <a:ext cx="0" cy="0"/>
-          <a:chOff x="0" y="0"/>
-          <a:chExt cx="0" cy="0"/>
-        </a:xfrm>
-      </p:grpSpPr>
-      <p:sp>
-        <p:nvSpPr>
-          <p:cNvPr id="2" name="Заголовок 1">
-            <a:extLst>
-              <a:ext uri="{FF2B5EF4-FFF2-40B4-BE49-F238E27FC236}">
                 <a16:creationId xmlns:a16="http://schemas.microsoft.com/office/drawing/2014/main" id="{64FEC100-84B7-4359-B01A-C345786DE058}"/>
               </a:ext>
             </a:extLst>
@@ -14261,7 +14197,7 @@
 </p:sld>
 </file>
 
-<file path=ppt/slides/slide7.xml><?xml version="1.0" encoding="utf-8"?>
+<file path=ppt/slides/slide6.xml><?xml version="1.0" encoding="utf-8"?>
 <p:sld xmlns:a="http://schemas.openxmlformats.org/drawingml/2006/main" xmlns:r="http://schemas.openxmlformats.org/officeDocument/2006/relationships" xmlns:p="http://schemas.openxmlformats.org/presentationml/2006/main">
   <p:cSld>
     <p:spTree>
@@ -14349,10 +14285,115 @@
           </a:prstGeom>
         </p:spPr>
       </p:pic>
+      <p:sp>
+        <p:nvSpPr>
+          <p:cNvPr id="3" name="TextBox 2">
+            <a:extLst>
+              <a:ext uri="{FF2B5EF4-FFF2-40B4-BE49-F238E27FC236}">
+                <a16:creationId xmlns:a16="http://schemas.microsoft.com/office/drawing/2014/main" id="{25F0C021-556D-4DEB-9B16-3DC87F3EE94A}"/>
+              </a:ext>
+            </a:extLst>
+          </p:cNvPr>
+          <p:cNvSpPr txBox="1"/>
+          <p:nvPr/>
+        </p:nvSpPr>
+        <p:spPr>
+          <a:xfrm>
+            <a:off x="5032800" y="1180800"/>
+            <a:ext cx="3166251" cy="523220"/>
+          </a:xfrm>
+          <a:prstGeom prst="rect">
+            <a:avLst/>
+          </a:prstGeom>
+          <a:noFill/>
+        </p:spPr>
+        <p:txBody>
+          <a:bodyPr wrap="none" rtlCol="0">
+            <a:spAutoFit/>
+          </a:bodyPr>
+          <a:lstStyle/>
+          <a:p>
+            <a:r>
+              <a:rPr lang="ru-RU" dirty="0"/>
+              <a:t>Пул для офисной сети: 10.10.0.0/20</a:t>
+            </a:r>
+          </a:p>
+          <a:p>
+            <a:r>
+              <a:rPr lang="ru-RU" dirty="0"/>
+              <a:t>Пул для туннелей: 172.30.0.0/23</a:t>
+            </a:r>
+          </a:p>
+        </p:txBody>
+      </p:sp>
     </p:spTree>
     <p:extLst>
       <p:ext uri="{BB962C8B-B14F-4D97-AF65-F5344CB8AC3E}">
         <p14:creationId xmlns:p14="http://schemas.microsoft.com/office/powerpoint/2010/main" val="3232290608"/>
+      </p:ext>
+    </p:extLst>
+  </p:cSld>
+  <p:clrMapOvr>
+    <a:masterClrMapping/>
+  </p:clrMapOvr>
+</p:sld>
+</file>
+
+<file path=ppt/slides/slide7.xml><?xml version="1.0" encoding="utf-8"?>
+<p:sld xmlns:a="http://schemas.openxmlformats.org/drawingml/2006/main" xmlns:r="http://schemas.openxmlformats.org/officeDocument/2006/relationships" xmlns:p="http://schemas.openxmlformats.org/presentationml/2006/main">
+  <p:cSld>
+    <p:spTree>
+      <p:nvGrpSpPr>
+        <p:cNvPr id="1" name=""/>
+        <p:cNvGrpSpPr/>
+        <p:nvPr/>
+      </p:nvGrpSpPr>
+      <p:grpSpPr>
+        <a:xfrm>
+          <a:off x="0" y="0"/>
+          <a:ext cx="0" cy="0"/>
+          <a:chOff x="0" y="0"/>
+          <a:chExt cx="0" cy="0"/>
+        </a:xfrm>
+      </p:grpSpPr>
+      <p:sp>
+        <p:nvSpPr>
+          <p:cNvPr id="2" name="Заголовок 1">
+            <a:extLst>
+              <a:ext uri="{FF2B5EF4-FFF2-40B4-BE49-F238E27FC236}">
+                <a16:creationId xmlns:a16="http://schemas.microsoft.com/office/drawing/2014/main" id="{62AC4228-94A0-48B7-BB14-00DCC6173E9E}"/>
+              </a:ext>
+            </a:extLst>
+          </p:cNvPr>
+          <p:cNvSpPr>
+            <a:spLocks noGrp="1"/>
+          </p:cNvSpPr>
+          <p:nvPr>
+            <p:ph type="title"/>
+          </p:nvPr>
+        </p:nvSpPr>
+        <p:spPr>
+          <a:xfrm>
+            <a:off x="500550" y="1807535"/>
+            <a:ext cx="8520600" cy="3232297"/>
+          </a:xfrm>
+        </p:spPr>
+        <p:txBody>
+          <a:bodyPr/>
+          <a:lstStyle/>
+          <a:p>
+            <a:pPr algn="ctr"/>
+            <a:r>
+              <a:rPr lang="ru-RU" sz="4000" dirty="0"/>
+              <a:t>Реализация технологий</a:t>
+            </a:r>
+          </a:p>
+        </p:txBody>
+      </p:sp>
+    </p:spTree>
+    <p:extLst>
+      <p:ext uri="{BB962C8B-B14F-4D97-AF65-F5344CB8AC3E}">
+        <p14:creationId xmlns:p14="http://schemas.microsoft.com/office/powerpoint/2010/main" val="4215395071"/>
       </p:ext>
     </p:extLst>
   </p:cSld>

</xml_diff>